<commit_message>
Loesung von Patrick Tchuente
</commit_message>
<xml_diff>
--- a/patrick_task/Task handling.pptx
+++ b/patrick_task/Task handling.pptx
@@ -3389,20 +3389,12 @@
           <a:lstStyle/>
           <a:p>
             <a:r>
-              <a:rPr lang="de-DE" dirty="0">
+              <a:rPr lang="de-DE" dirty="0" smtClean="0">
                 <a:solidFill>
                   <a:srgbClr val="C00000"/>
                 </a:solidFill>
               </a:rPr>
-              <a:t>G</a:t>
-            </a:r>
-            <a:r>
-              <a:rPr lang="de-DE" dirty="0" smtClean="0">
-                <a:solidFill>
-                  <a:srgbClr val="C00000"/>
-                </a:solidFill>
-              </a:rPr>
-              <a:t>liederung</a:t>
+              <a:t>Outline</a:t>
             </a:r>
             <a:endParaRPr lang="de-DE" dirty="0">
               <a:solidFill>
@@ -4023,13 +4015,8 @@
             </a:pPr>
             <a:r>
               <a:rPr lang="en-US" dirty="0" smtClean="0"/>
-              <a:t>For the realization of this model, only two features were treated: "cancelation" and "prices". The reason was that "cancelation" correlates more with "prices" than the other features. See the following </a:t>
-            </a:r>
-            <a:r>
-              <a:rPr lang="en-US" dirty="0" smtClean="0"/>
-              <a:t>figure (next Page).</a:t>
-            </a:r>
-            <a:endParaRPr lang="en-US" dirty="0" smtClean="0"/>
+              <a:t>For the realization of this model, only two features were treated: "cancelation" and "prices". The reason was that "cancelation" correlates more with "prices" than the other features. See the following figure (next Page).</a:t>
+            </a:r>
           </a:p>
           <a:p>
             <a:pPr marL="0" indent="0">

</xml_diff>